<commit_message>
actualizadas diapos e informe
</commit_message>
<xml_diff>
--- a/diapositivas CSS.pptx
+++ b/diapositivas CSS.pptx
@@ -17630,15 +17630,7 @@
             <a:pPr lvl="0"/>
             <a:r>
               <a:rPr lang="es-ES_tradnl" dirty="0"/>
-              <a:t>Sitios </a:t>
-            </a:r>
-            <a:r>
-              <a:rPr lang="es-ES_tradnl"/>
-              <a:t>web más </a:t>
-            </a:r>
-            <a:r>
-              <a:rPr lang="es-ES_tradnl" dirty="0"/>
-              <a:t>fáciles de actualizar y modificar.</a:t>
+              <a:t>Sitios web más fáciles de actualizar y modificar.</a:t>
             </a:r>
             <a:endParaRPr lang="es-EC" dirty="0"/>
           </a:p>

</xml_diff>